<commit_message>
atualização do ppt da 2° Sprint
</commit_message>
<xml_diff>
--- a/Documentação/Slides/Entregas da 2° Sprint.pptx
+++ b/Documentação/Slides/Entregas da 2° Sprint.pptx
@@ -14,6 +14,7 @@
     <p:sldId id="263" r:id="rId8"/>
     <p:sldId id="264" r:id="rId9"/>
     <p:sldId id="265" r:id="rId10"/>
+    <p:sldId id="266" r:id="rId11"/>
   </p:sldIdLst>
   <p:sldSz cx="12192000" cy="6858000"/>
   <p:notesSz cx="6858000" cy="9144000"/>
@@ -112,6 +113,11 @@
       </a:defRPr>
     </a:lvl9pPr>
   </p:defaultTextStyle>
+  <p:extLst>
+    <p:ext uri="{EFAFB233-063F-42B5-8137-9DF3F51BA10A}">
+      <p15:sldGuideLst xmlns:p15="http://schemas.microsoft.com/office/powerpoint/2012/main"/>
+    </p:ext>
+  </p:extLst>
 </p:presentation>
 </file>
 
@@ -262,7 +268,7 @@
           <a:p>
             <a:fld id="{F698199D-10B3-4A10-A497-FC332B6FE00D}" type="datetimeFigureOut">
               <a:rPr lang="pt-BR" smtClean="0"/>
-              <a:t>21/10/2019</a:t>
+              <a:t>22/10/2019</a:t>
             </a:fld>
             <a:endParaRPr lang="pt-BR"/>
           </a:p>
@@ -460,7 +466,7 @@
           <a:p>
             <a:fld id="{F698199D-10B3-4A10-A497-FC332B6FE00D}" type="datetimeFigureOut">
               <a:rPr lang="pt-BR" smtClean="0"/>
-              <a:t>21/10/2019</a:t>
+              <a:t>22/10/2019</a:t>
             </a:fld>
             <a:endParaRPr lang="pt-BR"/>
           </a:p>
@@ -668,7 +674,7 @@
           <a:p>
             <a:fld id="{F698199D-10B3-4A10-A497-FC332B6FE00D}" type="datetimeFigureOut">
               <a:rPr lang="pt-BR" smtClean="0"/>
-              <a:t>21/10/2019</a:t>
+              <a:t>22/10/2019</a:t>
             </a:fld>
             <a:endParaRPr lang="pt-BR"/>
           </a:p>
@@ -866,7 +872,7 @@
           <a:p>
             <a:fld id="{F698199D-10B3-4A10-A497-FC332B6FE00D}" type="datetimeFigureOut">
               <a:rPr lang="pt-BR" smtClean="0"/>
-              <a:t>21/10/2019</a:t>
+              <a:t>22/10/2019</a:t>
             </a:fld>
             <a:endParaRPr lang="pt-BR"/>
           </a:p>
@@ -1141,7 +1147,7 @@
           <a:p>
             <a:fld id="{F698199D-10B3-4A10-A497-FC332B6FE00D}" type="datetimeFigureOut">
               <a:rPr lang="pt-BR" smtClean="0"/>
-              <a:t>21/10/2019</a:t>
+              <a:t>22/10/2019</a:t>
             </a:fld>
             <a:endParaRPr lang="pt-BR"/>
           </a:p>
@@ -1406,7 +1412,7 @@
           <a:p>
             <a:fld id="{F698199D-10B3-4A10-A497-FC332B6FE00D}" type="datetimeFigureOut">
               <a:rPr lang="pt-BR" smtClean="0"/>
-              <a:t>21/10/2019</a:t>
+              <a:t>22/10/2019</a:t>
             </a:fld>
             <a:endParaRPr lang="pt-BR"/>
           </a:p>
@@ -1818,7 +1824,7 @@
           <a:p>
             <a:fld id="{F698199D-10B3-4A10-A497-FC332B6FE00D}" type="datetimeFigureOut">
               <a:rPr lang="pt-BR" smtClean="0"/>
-              <a:t>21/10/2019</a:t>
+              <a:t>22/10/2019</a:t>
             </a:fld>
             <a:endParaRPr lang="pt-BR"/>
           </a:p>
@@ -1959,7 +1965,7 @@
           <a:p>
             <a:fld id="{F698199D-10B3-4A10-A497-FC332B6FE00D}" type="datetimeFigureOut">
               <a:rPr lang="pt-BR" smtClean="0"/>
-              <a:t>21/10/2019</a:t>
+              <a:t>22/10/2019</a:t>
             </a:fld>
             <a:endParaRPr lang="pt-BR"/>
           </a:p>
@@ -2072,7 +2078,7 @@
           <a:p>
             <a:fld id="{F698199D-10B3-4A10-A497-FC332B6FE00D}" type="datetimeFigureOut">
               <a:rPr lang="pt-BR" smtClean="0"/>
-              <a:t>21/10/2019</a:t>
+              <a:t>22/10/2019</a:t>
             </a:fld>
             <a:endParaRPr lang="pt-BR"/>
           </a:p>
@@ -2383,7 +2389,7 @@
           <a:p>
             <a:fld id="{F698199D-10B3-4A10-A497-FC332B6FE00D}" type="datetimeFigureOut">
               <a:rPr lang="pt-BR" smtClean="0"/>
-              <a:t>21/10/2019</a:t>
+              <a:t>22/10/2019</a:t>
             </a:fld>
             <a:endParaRPr lang="pt-BR"/>
           </a:p>
@@ -2671,7 +2677,7 @@
           <a:p>
             <a:fld id="{F698199D-10B3-4A10-A497-FC332B6FE00D}" type="datetimeFigureOut">
               <a:rPr lang="pt-BR" smtClean="0"/>
-              <a:t>21/10/2019</a:t>
+              <a:t>22/10/2019</a:t>
             </a:fld>
             <a:endParaRPr lang="pt-BR"/>
           </a:p>
@@ -2912,7 +2918,7 @@
           <a:p>
             <a:fld id="{F698199D-10B3-4A10-A497-FC332B6FE00D}" type="datetimeFigureOut">
               <a:rPr lang="pt-BR" smtClean="0"/>
-              <a:t>21/10/2019</a:t>
+              <a:t>22/10/2019</a:t>
             </a:fld>
             <a:endParaRPr lang="pt-BR"/>
           </a:p>
@@ -3492,14 +3498,22 @@
           <a:lstStyle/>
           <a:p>
             <a:r>
-              <a:rPr lang="en-GB" sz="6000">
+              <a:rPr lang="en-GB" sz="6000" dirty="0" err="1">
                 <a:solidFill>
                   <a:srgbClr val="FFFFFF"/>
                 </a:solidFill>
               </a:rPr>
-              <a:t>Entregas da 2° Sprint</a:t>
-            </a:r>
-            <a:endParaRPr lang="pt-BR" sz="6000">
+              <a:t>Entregas</a:t>
+            </a:r>
+            <a:r>
+              <a:rPr lang="en-GB" sz="6000" dirty="0">
+                <a:solidFill>
+                  <a:srgbClr val="FFFFFF"/>
+                </a:solidFill>
+              </a:rPr>
+              <a:t> da 2° Sprint</a:t>
+            </a:r>
+            <a:endParaRPr lang="pt-BR" sz="6000" dirty="0">
               <a:solidFill>
                 <a:srgbClr val="FFFFFF"/>
               </a:solidFill>
@@ -3526,18 +3540,97 @@
         <p:spPr>
           <a:xfrm>
             <a:off x="1376313" y="5665510"/>
-            <a:ext cx="9426806" cy="719122"/>
+            <a:ext cx="3442072" cy="719122"/>
           </a:xfrm>
         </p:spPr>
         <p:txBody>
           <a:bodyPr>
-            <a:normAutofit/>
+            <a:noAutofit/>
           </a:bodyPr>
           <a:lstStyle/>
           <a:p>
-            <a:endParaRPr lang="pt-BR">
+            <a:pPr marL="342900" indent="-342900" algn="l">
+              <a:buFont typeface="Arial" panose="020B0604020202020204" pitchFamily="34" charset="0"/>
+              <a:buChar char="•"/>
+            </a:pPr>
+            <a:r>
+              <a:rPr lang="en-GB" sz="1600" dirty="0" err="1">
+                <a:solidFill>
+                  <a:schemeClr val="bg1"/>
+                </a:solidFill>
+              </a:rPr>
+              <a:t>Fabíola</a:t>
+            </a:r>
+            <a:r>
+              <a:rPr lang="en-GB" sz="1600" dirty="0">
+                <a:solidFill>
+                  <a:schemeClr val="bg1"/>
+                </a:solidFill>
+              </a:rPr>
+              <a:t> </a:t>
+            </a:r>
+            <a:r>
+              <a:rPr lang="en-GB" sz="1600" dirty="0" err="1">
+                <a:solidFill>
+                  <a:schemeClr val="bg1"/>
+                </a:solidFill>
+              </a:rPr>
+              <a:t>Canedo</a:t>
+            </a:r>
+            <a:r>
+              <a:rPr lang="en-GB" sz="1600" dirty="0">
+                <a:solidFill>
+                  <a:schemeClr val="bg1"/>
+                </a:solidFill>
+              </a:rPr>
+              <a:t> </a:t>
+            </a:r>
+            <a:r>
+              <a:rPr lang="en-GB" sz="1600" dirty="0" err="1">
+                <a:solidFill>
+                  <a:schemeClr val="bg1"/>
+                </a:solidFill>
+              </a:rPr>
+              <a:t>ra</a:t>
+            </a:r>
+            <a:r>
+              <a:rPr lang="en-GB" sz="1600" dirty="0">
+                <a:solidFill>
+                  <a:schemeClr val="bg1"/>
+                </a:solidFill>
+              </a:rPr>
+              <a:t> </a:t>
+            </a:r>
+            <a:r>
+              <a:rPr lang="pt-BR" sz="1600" dirty="0">
+                <a:solidFill>
+                  <a:schemeClr val="bg1"/>
+                </a:solidFill>
+              </a:rPr>
+              <a:t>RA 01191065</a:t>
+            </a:r>
+            <a:endParaRPr lang="en-GB" sz="1600" dirty="0">
               <a:solidFill>
-                <a:srgbClr val="E7E6E6"/>
+                <a:schemeClr val="bg1"/>
+              </a:solidFill>
+            </a:endParaRPr>
+          </a:p>
+          <a:p>
+            <a:pPr marL="342900" indent="-342900" algn="l">
+              <a:buFont typeface="Arial" panose="020B0604020202020204" pitchFamily="34" charset="0"/>
+              <a:buChar char="•"/>
+            </a:pPr>
+            <a:r>
+              <a:rPr lang="en-GB" sz="1600" dirty="0">
+                <a:solidFill>
+                  <a:schemeClr val="bg1"/>
+                </a:solidFill>
+              </a:rPr>
+              <a:t>Gabriel Sutto RA 01191127 </a:t>
+            </a:r>
+            <a:endParaRPr lang="pt-BR" sz="1600" dirty="0">
+              <a:solidFill>
+                <a:schemeClr val="bg1"/>
               </a:solidFill>
             </a:endParaRPr>
           </a:p>
@@ -3579,6 +3672,186 @@
           </a:prstGeom>
         </p:spPr>
       </p:pic>
+      <p:sp>
+        <p:nvSpPr>
+          <p:cNvPr id="4" name="CaixaDeTexto 3">
+            <a:extLst>
+              <a:ext uri="{FF2B5EF4-FFF2-40B4-BE49-F238E27FC236}">
+                <a16:creationId xmlns:a16="http://schemas.microsoft.com/office/drawing/2014/main" id="{FE0BA6B3-9AE7-455E-BE18-C2B6E07DFBC4}"/>
+              </a:ext>
+            </a:extLst>
+          </p:cNvPr>
+          <p:cNvSpPr txBox="1"/>
+          <p:nvPr/>
+        </p:nvSpPr>
+        <p:spPr>
+          <a:xfrm>
+            <a:off x="4906887" y="5709599"/>
+            <a:ext cx="3442072" cy="1200329"/>
+          </a:xfrm>
+          <a:prstGeom prst="rect">
+            <a:avLst/>
+          </a:prstGeom>
+          <a:noFill/>
+        </p:spPr>
+        <p:txBody>
+          <a:bodyPr wrap="square" rtlCol="0">
+            <a:spAutoFit/>
+          </a:bodyPr>
+          <a:lstStyle/>
+          <a:p>
+            <a:pPr marL="285750" indent="-285750">
+              <a:buFont typeface="Arial" panose="020B0604020202020204" pitchFamily="34" charset="0"/>
+              <a:buChar char="•"/>
+            </a:pPr>
+            <a:r>
+              <a:rPr lang="en-GB" dirty="0">
+                <a:solidFill>
+                  <a:schemeClr val="bg1"/>
+                </a:solidFill>
+              </a:rPr>
+              <a:t> </a:t>
+            </a:r>
+            <a:r>
+              <a:rPr lang="en-GB" sz="1600" dirty="0">
+                <a:solidFill>
+                  <a:schemeClr val="bg1"/>
+                </a:solidFill>
+              </a:rPr>
+              <a:t>Leonardo Italo RA </a:t>
+            </a:r>
+            <a:r>
+              <a:rPr lang="pt-BR" sz="1600" dirty="0">
+                <a:solidFill>
+                  <a:schemeClr val="bg1"/>
+                </a:solidFill>
+              </a:rPr>
+              <a:t>01191086</a:t>
+            </a:r>
+            <a:endParaRPr lang="en-GB" sz="1600" dirty="0">
+              <a:solidFill>
+                <a:schemeClr val="bg1"/>
+              </a:solidFill>
+            </a:endParaRPr>
+          </a:p>
+          <a:p>
+            <a:pPr marL="285750" indent="-285750">
+              <a:buFont typeface="Arial" panose="020B0604020202020204" pitchFamily="34" charset="0"/>
+              <a:buChar char="•"/>
+            </a:pPr>
+            <a:r>
+              <a:rPr lang="en-GB" sz="1600" dirty="0">
+                <a:solidFill>
+                  <a:schemeClr val="bg1"/>
+                </a:solidFill>
+              </a:rPr>
+              <a:t>Natalia Medina RA</a:t>
+            </a:r>
+            <a:r>
+              <a:rPr lang="en-GB" dirty="0">
+                <a:solidFill>
+                  <a:schemeClr val="bg1"/>
+                </a:solidFill>
+              </a:rPr>
+              <a:t> </a:t>
+            </a:r>
+            <a:r>
+              <a:rPr lang="pt-BR" dirty="0">
+                <a:solidFill>
+                  <a:schemeClr val="bg1"/>
+                </a:solidFill>
+              </a:rPr>
+              <a:t>01191104</a:t>
+            </a:r>
+          </a:p>
+          <a:p>
+            <a:pPr marL="285750" indent="-285750">
+              <a:buFont typeface="Arial" panose="020B0604020202020204" pitchFamily="34" charset="0"/>
+              <a:buChar char="•"/>
+            </a:pPr>
+            <a:endParaRPr lang="en-GB" dirty="0">
+              <a:solidFill>
+                <a:schemeClr val="bg1"/>
+              </a:solidFill>
+            </a:endParaRPr>
+          </a:p>
+          <a:p>
+            <a:pPr marL="285750" indent="-285750">
+              <a:buFont typeface="Arial" panose="020B0604020202020204" pitchFamily="34" charset="0"/>
+              <a:buChar char="•"/>
+            </a:pPr>
+            <a:endParaRPr lang="pt-BR" dirty="0">
+              <a:solidFill>
+                <a:schemeClr val="bg1"/>
+              </a:solidFill>
+            </a:endParaRPr>
+          </a:p>
+        </p:txBody>
+      </p:sp>
+      <p:sp>
+        <p:nvSpPr>
+          <p:cNvPr id="7" name="CaixaDeTexto 6">
+            <a:extLst>
+              <a:ext uri="{FF2B5EF4-FFF2-40B4-BE49-F238E27FC236}">
+                <a16:creationId xmlns:a16="http://schemas.microsoft.com/office/drawing/2014/main" id="{7605C969-8334-4385-902B-06821A819F5D}"/>
+              </a:ext>
+            </a:extLst>
+          </p:cNvPr>
+          <p:cNvSpPr txBox="1"/>
+          <p:nvPr/>
+        </p:nvSpPr>
+        <p:spPr>
+          <a:xfrm>
+            <a:off x="7543555" y="5719734"/>
+            <a:ext cx="4485688" cy="338554"/>
+          </a:xfrm>
+          <a:prstGeom prst="rect">
+            <a:avLst/>
+          </a:prstGeom>
+          <a:noFill/>
+        </p:spPr>
+        <p:txBody>
+          <a:bodyPr wrap="square" rtlCol="0">
+            <a:spAutoFit/>
+          </a:bodyPr>
+          <a:lstStyle/>
+          <a:p>
+            <a:pPr lvl="3"/>
+            <a:r>
+              <a:rPr lang="en-GB" sz="1600" dirty="0">
+                <a:solidFill>
+                  <a:schemeClr val="bg1"/>
+                </a:solidFill>
+              </a:rPr>
+              <a:t>Yuri </a:t>
+            </a:r>
+            <a:r>
+              <a:rPr lang="en-GB" sz="1600" dirty="0" err="1">
+                <a:solidFill>
+                  <a:schemeClr val="bg1"/>
+                </a:solidFill>
+              </a:rPr>
+              <a:t>Uliam</a:t>
+            </a:r>
+            <a:r>
+              <a:rPr lang="en-GB" sz="1600" dirty="0">
+                <a:solidFill>
+                  <a:schemeClr val="bg1"/>
+                </a:solidFill>
+              </a:rPr>
+              <a:t> RA </a:t>
+            </a:r>
+            <a:r>
+              <a:rPr lang="pt-BR" sz="1600" dirty="0">
+                <a:solidFill>
+                  <a:schemeClr val="bg1"/>
+                </a:solidFill>
+              </a:rPr>
+              <a:t>01191120</a:t>
+            </a:r>
+          </a:p>
+        </p:txBody>
+      </p:sp>
     </p:spTree>
     <p:extLst>
       <p:ext uri="{BB962C8B-B14F-4D97-AF65-F5344CB8AC3E}">
@@ -3588,6 +3861,284 @@
   </p:cSld>
   <p:clrMapOvr>
     <a:masterClrMapping/>
+  </p:clrMapOvr>
+</p:sld>
+</file>
+
+<file path=ppt/slides/slide10.xml><?xml version="1.0" encoding="utf-8"?>
+<p:sld xmlns:a="http://schemas.openxmlformats.org/drawingml/2006/main" xmlns:r="http://schemas.openxmlformats.org/officeDocument/2006/relationships" xmlns:p="http://schemas.openxmlformats.org/presentationml/2006/main">
+  <p:cSld>
+    <p:bg>
+      <p:bgPr>
+        <a:solidFill>
+          <a:schemeClr val="tx1"/>
+        </a:solidFill>
+        <a:effectLst/>
+      </p:bgPr>
+    </p:bg>
+    <p:spTree>
+      <p:nvGrpSpPr>
+        <p:cNvPr id="1" name=""/>
+        <p:cNvGrpSpPr/>
+        <p:nvPr/>
+      </p:nvGrpSpPr>
+      <p:grpSpPr>
+        <a:xfrm>
+          <a:off x="0" y="0"/>
+          <a:ext cx="0" cy="0"/>
+          <a:chOff x="0" y="0"/>
+          <a:chExt cx="0" cy="0"/>
+        </a:xfrm>
+      </p:grpSpPr>
+      <p:sp>
+        <p:nvSpPr>
+          <p:cNvPr id="19" name="Rectangle 18">
+            <a:extLst>
+              <a:ext uri="{FF2B5EF4-FFF2-40B4-BE49-F238E27FC236}">
+                <a16:creationId xmlns:a16="http://schemas.microsoft.com/office/drawing/2014/main" id="{2A8AA5BC-4F7A-4226-8F99-6D824B226A97}"/>
+              </a:ext>
+              <a:ext uri="{C183D7F6-B498-43B3-948B-1728B52AA6E4}">
+                <adec:decorative xmlns:adec="http://schemas.microsoft.com/office/drawing/2017/decorative" val="1"/>
+              </a:ext>
+            </a:extLst>
+          </p:cNvPr>
+          <p:cNvSpPr>
+            <a:spLocks noGrp="1" noRot="1" noChangeAspect="1" noMove="1" noResize="1" noEditPoints="1" noAdjustHandles="1" noChangeArrowheads="1" noChangeShapeType="1" noTextEdit="1"/>
+          </p:cNvSpPr>
+          <p:nvPr>
+            <p:extLst>
+              <p:ext uri="{386F3935-93C4-4BCD-93E2-E3B085C9AB24}">
+                <p16:designElem xmlns:p16="http://schemas.microsoft.com/office/powerpoint/2015/main" val="1"/>
+              </p:ext>
+            </p:extLst>
+          </p:nvPr>
+        </p:nvSpPr>
+        <p:spPr>
+          <a:xfrm>
+            <a:off x="0" y="-3324"/>
+            <a:ext cx="12192000" cy="6861324"/>
+          </a:xfrm>
+          <a:prstGeom prst="rect">
+            <a:avLst/>
+          </a:prstGeom>
+          <a:solidFill>
+            <a:schemeClr val="tx1"/>
+          </a:solidFill>
+          <a:ln>
+            <a:noFill/>
+          </a:ln>
+        </p:spPr>
+        <p:style>
+          <a:lnRef idx="2">
+            <a:schemeClr val="accent1">
+              <a:shade val="50000"/>
+            </a:schemeClr>
+          </a:lnRef>
+          <a:fillRef idx="1">
+            <a:schemeClr val="accent1"/>
+          </a:fillRef>
+          <a:effectRef idx="0">
+            <a:schemeClr val="accent1"/>
+          </a:effectRef>
+          <a:fontRef idx="minor">
+            <a:schemeClr val="lt1"/>
+          </a:fontRef>
+        </p:style>
+        <p:txBody>
+          <a:bodyPr rtlCol="0" anchor="ctr"/>
+          <a:lstStyle/>
+          <a:p>
+            <a:pPr algn="ctr"/>
+            <a:endParaRPr lang="en-US"/>
+          </a:p>
+        </p:txBody>
+      </p:sp>
+      <p:sp>
+        <p:nvSpPr>
+          <p:cNvPr id="21" name="Rectangle 20">
+            <a:extLst>
+              <a:ext uri="{FF2B5EF4-FFF2-40B4-BE49-F238E27FC236}">
+                <a16:creationId xmlns:a16="http://schemas.microsoft.com/office/drawing/2014/main" id="{3E5445C6-DD42-4979-86FF-03730E8C6DB0}"/>
+              </a:ext>
+              <a:ext uri="{C183D7F6-B498-43B3-948B-1728B52AA6E4}">
+                <adec:decorative xmlns:adec="http://schemas.microsoft.com/office/drawing/2017/decorative" val="1"/>
+              </a:ext>
+            </a:extLst>
+          </p:cNvPr>
+          <p:cNvSpPr>
+            <a:spLocks noGrp="1" noRot="1" noChangeAspect="1" noMove="1" noResize="1" noEditPoints="1" noAdjustHandles="1" noChangeArrowheads="1" noChangeShapeType="1" noTextEdit="1"/>
+          </p:cNvSpPr>
+          <p:nvPr>
+            <p:extLst>
+              <p:ext uri="{386F3935-93C4-4BCD-93E2-E3B085C9AB24}">
+                <p16:designElem xmlns:p16="http://schemas.microsoft.com/office/powerpoint/2015/main" val="1"/>
+              </p:ext>
+            </p:extLst>
+          </p:nvPr>
+        </p:nvSpPr>
+        <p:spPr bwMode="ltGray">
+          <a:xfrm>
+            <a:off x="321734" y="321733"/>
+            <a:ext cx="11573488" cy="6214534"/>
+          </a:xfrm>
+          <a:prstGeom prst="rect">
+            <a:avLst/>
+          </a:prstGeom>
+          <a:solidFill>
+            <a:schemeClr val="bg1">
+              <a:lumMod val="75000"/>
+              <a:lumOff val="25000"/>
+            </a:schemeClr>
+          </a:solidFill>
+          <a:ln w="127000" cap="sq" cmpd="thinThick">
+            <a:solidFill>
+              <a:schemeClr val="bg1">
+                <a:lumMod val="75000"/>
+                <a:lumOff val="25000"/>
+              </a:schemeClr>
+            </a:solidFill>
+          </a:ln>
+        </p:spPr>
+        <p:style>
+          <a:lnRef idx="2">
+            <a:schemeClr val="accent1">
+              <a:shade val="50000"/>
+            </a:schemeClr>
+          </a:lnRef>
+          <a:fillRef idx="1">
+            <a:schemeClr val="accent1"/>
+          </a:fillRef>
+          <a:effectRef idx="0">
+            <a:schemeClr val="accent1"/>
+          </a:effectRef>
+          <a:fontRef idx="minor">
+            <a:schemeClr val="lt1"/>
+          </a:fontRef>
+        </p:style>
+        <p:txBody>
+          <a:bodyPr rtlCol="0" anchor="ctr"/>
+          <a:lstStyle/>
+          <a:p>
+            <a:pPr algn="ctr"/>
+            <a:endParaRPr lang="en-US"/>
+          </a:p>
+        </p:txBody>
+      </p:sp>
+      <p:sp>
+        <p:nvSpPr>
+          <p:cNvPr id="2" name="Título 1">
+            <a:extLst>
+              <a:ext uri="{FF2B5EF4-FFF2-40B4-BE49-F238E27FC236}">
+                <a16:creationId xmlns:a16="http://schemas.microsoft.com/office/drawing/2014/main" id="{0AB2BA90-3112-4EC8-9FA1-6D0F27EFB525}"/>
+              </a:ext>
+            </a:extLst>
+          </p:cNvPr>
+          <p:cNvSpPr>
+            <a:spLocks noGrp="1"/>
+          </p:cNvSpPr>
+          <p:nvPr>
+            <p:ph type="title"/>
+          </p:nvPr>
+        </p:nvSpPr>
+        <p:spPr>
+          <a:xfrm>
+            <a:off x="1524000" y="1122362"/>
+            <a:ext cx="9144000" cy="2840037"/>
+          </a:xfrm>
+        </p:spPr>
+        <p:txBody>
+          <a:bodyPr vert="horz" lIns="91440" tIns="45720" rIns="91440" bIns="45720" rtlCol="0" anchor="b">
+            <a:normAutofit/>
+          </a:bodyPr>
+          <a:lstStyle/>
+          <a:p>
+            <a:pPr algn="ctr"/>
+            <a:r>
+              <a:rPr lang="en-US" sz="4900" kern="1200" dirty="0">
+                <a:solidFill>
+                  <a:schemeClr val="tx1"/>
+                </a:solidFill>
+                <a:latin typeface="+mj-lt"/>
+                <a:ea typeface="+mj-ea"/>
+                <a:cs typeface="+mj-cs"/>
+                <a:hlinkClick r:id="rId2"/>
+              </a:rPr>
+              <a:t>http://minehash.azurewebsites.net</a:t>
+            </a:r>
+            <a:endParaRPr lang="en-US" sz="4900" kern="1200" dirty="0">
+              <a:solidFill>
+                <a:schemeClr val="tx1"/>
+              </a:solidFill>
+              <a:latin typeface="+mj-lt"/>
+              <a:ea typeface="+mj-ea"/>
+              <a:cs typeface="+mj-cs"/>
+            </a:endParaRPr>
+          </a:p>
+        </p:txBody>
+      </p:sp>
+      <p:cxnSp>
+        <p:nvCxnSpPr>
+          <p:cNvPr id="23" name="Straight Connector 22">
+            <a:extLst>
+              <a:ext uri="{FF2B5EF4-FFF2-40B4-BE49-F238E27FC236}">
+                <a16:creationId xmlns:a16="http://schemas.microsoft.com/office/drawing/2014/main" id="{45000665-DFC7-417E-8FD7-516A0F15C975}"/>
+              </a:ext>
+              <a:ext uri="{C183D7F6-B498-43B3-948B-1728B52AA6E4}">
+                <adec:decorative xmlns:adec="http://schemas.microsoft.com/office/drawing/2017/decorative" val="1"/>
+              </a:ext>
+            </a:extLst>
+          </p:cNvPr>
+          <p:cNvCxnSpPr>
+            <a:cxnSpLocks noGrp="1" noRot="1" noChangeAspect="1" noMove="1" noResize="1" noEditPoints="1" noAdjustHandles="1" noChangeArrowheads="1" noChangeShapeType="1"/>
+          </p:cNvCxnSpPr>
+          <p:nvPr>
+            <p:extLst>
+              <p:ext uri="{386F3935-93C4-4BCD-93E2-E3B085C9AB24}">
+                <p16:designElem xmlns:p16="http://schemas.microsoft.com/office/powerpoint/2015/main" val="1"/>
+              </p:ext>
+            </p:extLst>
+          </p:nvPr>
+        </p:nvCxnSpPr>
+        <p:spPr>
+          <a:xfrm>
+            <a:off x="4724400" y="4109417"/>
+            <a:ext cx="2743200" cy="0"/>
+          </a:xfrm>
+          <a:prstGeom prst="line">
+            <a:avLst/>
+          </a:prstGeom>
+          <a:ln w="12700">
+            <a:solidFill>
+              <a:schemeClr val="tx1">
+                <a:lumMod val="85000"/>
+              </a:schemeClr>
+            </a:solidFill>
+          </a:ln>
+        </p:spPr>
+        <p:style>
+          <a:lnRef idx="1">
+            <a:schemeClr val="accent1"/>
+          </a:lnRef>
+          <a:fillRef idx="0">
+            <a:schemeClr val="accent1"/>
+          </a:fillRef>
+          <a:effectRef idx="0">
+            <a:schemeClr val="accent1"/>
+          </a:effectRef>
+          <a:fontRef idx="minor">
+            <a:schemeClr val="tx1"/>
+          </a:fontRef>
+        </p:style>
+      </p:cxnSp>
+    </p:spTree>
+    <p:extLst>
+      <p:ext uri="{BB962C8B-B14F-4D97-AF65-F5344CB8AC3E}">
+        <p14:creationId xmlns:p14="http://schemas.microsoft.com/office/powerpoint/2010/main" val="386053946"/>
+      </p:ext>
+    </p:extLst>
+  </p:cSld>
+  <p:clrMapOvr>
+    <a:overrideClrMapping bg1="dk1" tx1="lt1" bg2="dk2" tx2="lt2" accent1="accent1" accent2="accent2" accent3="accent3" accent4="accent4" accent5="accent5" accent6="accent6" hlink="hlink" folHlink="folHlink"/>
   </p:clrMapOvr>
 </p:sld>
 </file>

</xml_diff>